<commit_message>
Menambahkan fetch agar dapat terhubung ke backend
</commit_message>
<xml_diff>
--- a/backend/eksplor_individu/pptmaker-najmi/backend/project/PPTX/Horse_presentation.pptx
+++ b/backend/eksplor_individu/pptmaker-najmi/backend/project/PPTX/Horse_presentation.pptx
@@ -3174,7 +3174,7 @@
           <a:lstStyle/>
           <a:p>
             <a:r>
-              <a:t>Slide 9: Conservation of Wild Horses</a:t>
+              <a:t>Horses in Modern Society</a:t>
             </a:r>
           </a:p>
         </p:txBody>
@@ -3196,7 +3196,7 @@
           <a:p>
             <a:r>
               <a:rPr b="1" sz="1800"/>
-              <a:t>Wild horses, also known as mustangs, are facing threats such as habitat loss and overpopulation. Conservation efforts aim to protect and preserve these iconic animals for future generations.</a:t>
+              <a:t>In modern society, horses continue to play important roles in areas such as agriculture, therapy, sports, and recreation. They are valued for their beauty, grace, and companionship.</a:t>
             </a:r>
           </a:p>
         </p:txBody>
@@ -3228,7 +3228,7 @@
               <a:defRPr sz="1200"/>
             </a:pPr>
             <a:r>
-              <a:t>- Source: American Wild Horse Campaign</a:t>
+              <a:t>- https://horse-canada.com/horses-and-history/horses-use-today/</a:t>
             </a:r>
           </a:p>
         </p:txBody>
@@ -3267,7 +3267,7 @@
           <a:lstStyle/>
           <a:p>
             <a:r>
-              <a:t>Slide 10: Conclusion</a:t>
+              <a:t>Conclusion</a:t>
             </a:r>
           </a:p>
         </p:txBody>
@@ -3289,7 +3289,7 @@
           <a:p>
             <a:r>
               <a:rPr b="1" sz="1800"/>
-              <a:t>Horses have a special place in our hearts and history. Whether as companions, athletes, or working animals, they continue to captivate and inspire us with their beauty and grace.</a:t>
+              <a:t>Horses are fascinating creatures with a rich history and a significant presence in human culture. By understanding and respecting these magnificent animals, we can build strong and meaningful connections with them.</a:t>
             </a:r>
           </a:p>
         </p:txBody>
@@ -3321,7 +3321,7 @@
               <a:defRPr sz="1200"/>
             </a:pPr>
             <a:r>
-              <a:t>- Source: The Humane Society of the United States</a:t>
+              <a:t>- https://www.equinesciencenews.com/the-beauty-and-intricacy-of-the-horse/</a:t>
             </a:r>
           </a:p>
         </p:txBody>
@@ -3360,7 +3360,7 @@
           <a:lstStyle/>
           <a:p>
             <a:r>
-              <a:t>Slide 1: Introduction to Horses</a:t>
+              <a:t>Introduction to Horses</a:t>
             </a:r>
           </a:p>
         </p:txBody>
@@ -3382,7 +3382,7 @@
           <a:p>
             <a:r>
               <a:rPr b="1" sz="1800"/>
-              <a:t>Horses are majestic animals that have been a part of human history for thousands of years. They are known for their strength, speed, and beauty. Horses have played an important role in transportation, farming, and sports.</a:t>
+              <a:t>Horses are majestic and powerful animals that have been domesticated for thousands of years. They have played a crucial role in human history, from transportation to agriculture to sports.</a:t>
             </a:r>
           </a:p>
         </p:txBody>
@@ -3414,7 +3414,7 @@
               <a:defRPr sz="1200"/>
             </a:pPr>
             <a:r>
-              <a:t>- Source: National Geographic</a:t>
+              <a:t>- https://en.wikipedia.org/wiki/Horse</a:t>
             </a:r>
           </a:p>
         </p:txBody>
@@ -3453,7 +3453,7 @@
           <a:lstStyle/>
           <a:p>
             <a:r>
-              <a:t>Slide 2: Types of Horses</a:t>
+              <a:t>Types of Horses</a:t>
             </a:r>
           </a:p>
         </p:txBody>
@@ -3475,7 +3475,7 @@
           <a:p>
             <a:r>
               <a:rPr b="1" sz="1800"/>
-              <a:t>There are over 300 different breeds of horses, each with unique characteristics and abilities. Some common types include Arabian, Thoroughbred, and Quarter Horse.</a:t>
+              <a:t>There are over 300 different breeds of horses, each with its own unique characteristics and abilities. Some common types include Arabian, Thoroughbred, and Quarter Horse.</a:t>
             </a:r>
           </a:p>
         </p:txBody>
@@ -3507,7 +3507,7 @@
               <a:defRPr sz="1200"/>
             </a:pPr>
             <a:r>
-              <a:t>- Source: American Horse Council</a:t>
+              <a:t>- https://www.thesprucepets.com/horse-breeds-1118558</a:t>
             </a:r>
           </a:p>
         </p:txBody>
@@ -3546,7 +3546,7 @@
           <a:lstStyle/>
           <a:p>
             <a:r>
-              <a:t>Slide 3: Anatomy of a Horse</a:t>
+              <a:t>Anatomy of a Horse</a:t>
             </a:r>
           </a:p>
         </p:txBody>
@@ -3568,7 +3568,7 @@
           <a:p>
             <a:r>
               <a:rPr b="1" sz="1800"/>
-              <a:t>Horses have a complex anatomy that includes muscles, bones, and organs. Their powerful legs allow them to run at high speeds, while their large lungs enable them to have great stamina.</a:t>
+              <a:t>Horses have a complex and intricate anatomy, with strong muscles, a powerful heart, and a digestion system that is unique among animals. Understanding their anatomy is crucial for proper care and handling.</a:t>
             </a:r>
           </a:p>
         </p:txBody>
@@ -3600,7 +3600,7 @@
               <a:defRPr sz="1200"/>
             </a:pPr>
             <a:r>
-              <a:t>- Source: The Spruce Pets</a:t>
+              <a:t>- https://en.wikipedia.org/wiki/Equine_anatomy</a:t>
             </a:r>
           </a:p>
         </p:txBody>
@@ -3639,7 +3639,7 @@
           <a:lstStyle/>
           <a:p>
             <a:r>
-              <a:t>Slide 4: Behavior of Horses</a:t>
+              <a:t>Life Cycle of a Horse</a:t>
             </a:r>
           </a:p>
         </p:txBody>
@@ -3661,7 +3661,7 @@
           <a:p>
             <a:r>
               <a:rPr b="1" sz="1800"/>
-              <a:t>Horses are social animals that thrive in herds. They communicate with each other through body language, vocalizations, and even facial expressions. Understanding horse behavior is important for their care and training.</a:t>
+              <a:t>Horses typically live for 25 to 30 years, with their life cycle consisting of various stages such as foal, yearling, and adult. Proper nutrition and healthcare are essential for a horse's well-being.</a:t>
             </a:r>
           </a:p>
         </p:txBody>
@@ -3693,7 +3693,7 @@
               <a:defRPr sz="1200"/>
             </a:pPr>
             <a:r>
-              <a:t>- Source: American Association of Equine Practitioners</a:t>
+              <a:t>- https://www.msdvetmanual.com/management-and-nutrition/husbandry-of-horses</a:t>
             </a:r>
           </a:p>
         </p:txBody>
@@ -3732,7 +3732,7 @@
           <a:lstStyle/>
           <a:p>
             <a:r>
-              <a:t>Slide 5: Horse Care and Nutrition</a:t>
+              <a:t>Horse Behavior</a:t>
             </a:r>
           </a:p>
         </p:txBody>
@@ -3754,7 +3754,7 @@
           <a:p>
             <a:r>
               <a:rPr b="1" sz="1800"/>
-              <a:t>Proper care and nutrition are essential for keeping horses healthy and happy. They require a balanced diet, regular exercise, and veterinary care to thrive.</a:t>
+              <a:t>Horses are social animals that exhibit a wide range of behaviors, including communication through body language, grooming each other, and forming strong bonds with their herd mates.</a:t>
             </a:r>
           </a:p>
         </p:txBody>
@@ -3786,7 +3786,7 @@
               <a:defRPr sz="1200"/>
             </a:pPr>
             <a:r>
-              <a:t>- Source: The Horse</a:t>
+              <a:t>- https://www.horsemagazine.com/thm/2011/08/equine-behaviour-constant-themes-and-new-insights/</a:t>
             </a:r>
           </a:p>
         </p:txBody>
@@ -3825,7 +3825,7 @@
           <a:lstStyle/>
           <a:p>
             <a:r>
-              <a:t>Slide 6: Horse Riding and Sports</a:t>
+              <a:t>Horse Care and Maintenance</a:t>
             </a:r>
           </a:p>
         </p:txBody>
@@ -3847,7 +3847,7 @@
           <a:p>
             <a:r>
               <a:rPr b="1" sz="1800"/>
-              <a:t>Horse riding is a popular recreational activity and competitive sport. From dressage to show jumping, horses and riders showcase their skills and athleticism in various disciplines.</a:t>
+              <a:t>Proper care and maintenance of horses involve providing them with a balanced diet, regular exercise, grooming, and veterinary care. Good horsemanship is essential for keeping horses healthy and happy.</a:t>
             </a:r>
           </a:p>
         </p:txBody>
@@ -3879,7 +3879,7 @@
               <a:defRPr sz="1200"/>
             </a:pPr>
             <a:r>
-              <a:t>- Source: United States Equestrian Federation</a:t>
+              <a:t>- https://www.equisearch.com/discoverhorses/horse-care-10-care-tips-horse-care-25281</a:t>
             </a:r>
           </a:p>
         </p:txBody>
@@ -3918,7 +3918,7 @@
           <a:lstStyle/>
           <a:p>
             <a:r>
-              <a:t>Slide 7: Famous Horses in History</a:t>
+              <a:t>Horse Riding and Training</a:t>
             </a:r>
           </a:p>
         </p:txBody>
@@ -3940,7 +3940,7 @@
           <a:p>
             <a:r>
               <a:rPr b="1" sz="1800"/>
-              <a:t>Throughout history, there have been many famous horses that have left their mark. Examples include Secretariat, Black Beauty, and Trigger.</a:t>
+              <a:t>Horse riding and training require skill, patience, and mutual trust between the horse and the rider. Different disciplines such as dressage, show jumping, and western riding offer a variety of ways to enjoy working with horses.</a:t>
             </a:r>
           </a:p>
         </p:txBody>
@@ -3972,7 +3972,7 @@
               <a:defRPr sz="1200"/>
             </a:pPr>
             <a:r>
-              <a:t>- Source: History Collection</a:t>
+              <a:t>- https://practicalhorsemanmag.com/training/english-disciplines-explained-14986</a:t>
             </a:r>
           </a:p>
         </p:txBody>
@@ -4011,7 +4011,7 @@
           <a:lstStyle/>
           <a:p>
             <a:r>
-              <a:t>Slide 8: Equine Health and Diseases</a:t>
+              <a:t>Famous Horses in History</a:t>
             </a:r>
           </a:p>
         </p:txBody>
@@ -4033,7 +4033,7 @@
           <a:p>
             <a:r>
               <a:rPr b="1" sz="1800"/>
-              <a:t>Horses are susceptible to various health issues and diseases, such as colic, laminitis, and equine influenza. Regular veterinary check-ups and proper management are crucial for preventing and treating these conditions.</a:t>
+              <a:t>Throughout history, there have been many famous horses that have left a lasting impact on human society. Examples include Bucephalus, Seabiscuit, and Secretariat.</a:t>
             </a:r>
           </a:p>
         </p:txBody>
@@ -4065,7 +4065,7 @@
               <a:defRPr sz="1200"/>
             </a:pPr>
             <a:r>
-              <a:t>- Source: The Merck Veterinary Manual</a:t>
+              <a:t>- https://www.horseandman.com/people-and-places/10-historical-horses-with-amazing-stories/</a:t>
             </a:r>
           </a:p>
         </p:txBody>

</xml_diff>